<commit_message>
Revert "Updated diagrams and docs"
</commit_message>
<xml_diff>
--- a/docs/diagrams/ModelComponentClassBetterOopDiagram.pptx
+++ b/docs/diagrams/ModelComponentClassBetterOopDiagram.pptx
@@ -208,7 +208,7 @@
           <a:p>
             <a:fld id="{F5CC4B3F-88C1-4FFA-B1B6-F41C21DC6924}" type="datetimeFigureOut">
               <a:rPr lang="en-US" smtClean="0"/>
-              <a:t>3/5/19</a:t>
+              <a:t>12/5/2018</a:t>
             </a:fld>
             <a:endParaRPr lang="en-US"/>
           </a:p>
@@ -654,7 +654,7 @@
           <a:p>
             <a:fld id="{78C97017-6FC3-485B-9764-EAC9E56C1D49}" type="datetimeFigureOut">
               <a:rPr lang="en-US" smtClean="0"/>
-              <a:t>3/5/19</a:t>
+              <a:t>12/5/2018</a:t>
             </a:fld>
             <a:endParaRPr lang="en-US"/>
           </a:p>
@@ -822,7 +822,7 @@
           <a:p>
             <a:fld id="{78C97017-6FC3-485B-9764-EAC9E56C1D49}" type="datetimeFigureOut">
               <a:rPr lang="en-US" smtClean="0"/>
-              <a:t>3/5/19</a:t>
+              <a:t>12/5/2018</a:t>
             </a:fld>
             <a:endParaRPr lang="en-US"/>
           </a:p>
@@ -1000,7 +1000,7 @@
           <a:p>
             <a:fld id="{78C97017-6FC3-485B-9764-EAC9E56C1D49}" type="datetimeFigureOut">
               <a:rPr lang="en-US" smtClean="0"/>
-              <a:t>3/5/19</a:t>
+              <a:t>12/5/2018</a:t>
             </a:fld>
             <a:endParaRPr lang="en-US"/>
           </a:p>
@@ -1168,7 +1168,7 @@
           <a:p>
             <a:fld id="{78C97017-6FC3-485B-9764-EAC9E56C1D49}" type="datetimeFigureOut">
               <a:rPr lang="en-US" smtClean="0"/>
-              <a:t>3/5/19</a:t>
+              <a:t>12/5/2018</a:t>
             </a:fld>
             <a:endParaRPr lang="en-US"/>
           </a:p>
@@ -1413,7 +1413,7 @@
           <a:p>
             <a:fld id="{78C97017-6FC3-485B-9764-EAC9E56C1D49}" type="datetimeFigureOut">
               <a:rPr lang="en-US" smtClean="0"/>
-              <a:t>3/5/19</a:t>
+              <a:t>12/5/2018</a:t>
             </a:fld>
             <a:endParaRPr lang="en-US"/>
           </a:p>
@@ -1698,7 +1698,7 @@
           <a:p>
             <a:fld id="{78C97017-6FC3-485B-9764-EAC9E56C1D49}" type="datetimeFigureOut">
               <a:rPr lang="en-US" smtClean="0"/>
-              <a:t>3/5/19</a:t>
+              <a:t>12/5/2018</a:t>
             </a:fld>
             <a:endParaRPr lang="en-US"/>
           </a:p>
@@ -2117,7 +2117,7 @@
           <a:p>
             <a:fld id="{78C97017-6FC3-485B-9764-EAC9E56C1D49}" type="datetimeFigureOut">
               <a:rPr lang="en-US" smtClean="0"/>
-              <a:t>3/5/19</a:t>
+              <a:t>12/5/2018</a:t>
             </a:fld>
             <a:endParaRPr lang="en-US"/>
           </a:p>
@@ -2234,7 +2234,7 @@
           <a:p>
             <a:fld id="{78C97017-6FC3-485B-9764-EAC9E56C1D49}" type="datetimeFigureOut">
               <a:rPr lang="en-US" smtClean="0"/>
-              <a:t>3/5/19</a:t>
+              <a:t>12/5/2018</a:t>
             </a:fld>
             <a:endParaRPr lang="en-US"/>
           </a:p>
@@ -2329,7 +2329,7 @@
           <a:p>
             <a:fld id="{78C97017-6FC3-485B-9764-EAC9E56C1D49}" type="datetimeFigureOut">
               <a:rPr lang="en-US" smtClean="0"/>
-              <a:t>3/5/19</a:t>
+              <a:t>12/5/2018</a:t>
             </a:fld>
             <a:endParaRPr lang="en-US"/>
           </a:p>
@@ -2604,7 +2604,7 @@
           <a:p>
             <a:fld id="{78C97017-6FC3-485B-9764-EAC9E56C1D49}" type="datetimeFigureOut">
               <a:rPr lang="en-US" smtClean="0"/>
-              <a:t>3/5/19</a:t>
+              <a:t>12/5/2018</a:t>
             </a:fld>
             <a:endParaRPr lang="en-US"/>
           </a:p>
@@ -2856,7 +2856,7 @@
           <a:p>
             <a:fld id="{78C97017-6FC3-485B-9764-EAC9E56C1D49}" type="datetimeFigureOut">
               <a:rPr lang="en-US" smtClean="0"/>
-              <a:t>3/5/19</a:t>
+              <a:t>12/5/2018</a:t>
             </a:fld>
             <a:endParaRPr lang="en-US"/>
           </a:p>
@@ -3067,7 +3067,7 @@
           <a:p>
             <a:fld id="{78C97017-6FC3-485B-9764-EAC9E56C1D49}" type="datetimeFigureOut">
               <a:rPr lang="en-US" smtClean="0"/>
-              <a:t>3/5/19</a:t>
+              <a:t>12/5/2018</a:t>
             </a:fld>
             <a:endParaRPr lang="en-US"/>
           </a:p>
@@ -3651,7 +3651,7 @@
         <p:spPr>
           <a:xfrm>
             <a:off x="5282183" y="3347776"/>
-            <a:ext cx="711705" cy="346760"/>
+            <a:ext cx="708186" cy="346760"/>
           </a:xfrm>
           <a:prstGeom prst="rect">
             <a:avLst/>
@@ -3688,7 +3688,7 @@
                   <a:srgbClr val="7030A0"/>
                 </a:solidFill>
               </a:rPr>
-              <a:t>Customer</a:t>
+              <a:t>Person</a:t>
             </a:r>
             <a:endParaRPr lang="en-SG" sz="1050" dirty="0">
               <a:solidFill>

</xml_diff>